<commit_message>
Updated latest recommended API version. Included Scout libraries and test application. Updated documentation.
</commit_message>
<xml_diff>
--- a/Documentation/19inch_control_layout.pptx
+++ b/Documentation/19inch_control_layout.pptx
@@ -196,7 +196,7 @@
           <a:p>
             <a:fld id="{072B8F1F-ED4A-496F-A690-F89B57685F05}" type="datetimeFigureOut">
               <a:rPr lang="en-US" smtClean="0"/>
-              <a:t>6/26/2014</a:t>
+              <a:t>1/19/2015</a:t>
             </a:fld>
             <a:endParaRPr lang="en-US"/>
           </a:p>
@@ -988,7 +988,7 @@
                 </a:solidFill>
               </a:rPr>
               <a:pPr/>
-              <a:t>6/26/2014</a:t>
+              <a:t>1/19/2015</a:t>
             </a:fld>
             <a:endParaRPr lang="en-US" dirty="0">
               <a:solidFill>
@@ -1190,7 +1190,7 @@
                 </a:solidFill>
               </a:rPr>
               <a:pPr/>
-              <a:t>6/26/2014</a:t>
+              <a:t>1/19/2015</a:t>
             </a:fld>
             <a:endParaRPr lang="en-US" dirty="0">
               <a:solidFill>
@@ -1402,7 +1402,7 @@
                 </a:solidFill>
               </a:rPr>
               <a:pPr/>
-              <a:t>6/26/2014</a:t>
+              <a:t>1/19/2015</a:t>
             </a:fld>
             <a:endParaRPr lang="en-US" dirty="0">
               <a:solidFill>
@@ -1676,7 +1676,7 @@
                 </a:solidFill>
               </a:rPr>
               <a:pPr/>
-              <a:t>6/26/2014</a:t>
+              <a:t>1/19/2015</a:t>
             </a:fld>
             <a:endParaRPr lang="en-US">
               <a:solidFill>
@@ -1878,7 +1878,7 @@
                 </a:solidFill>
               </a:rPr>
               <a:pPr/>
-              <a:t>6/26/2014</a:t>
+              <a:t>1/19/2015</a:t>
             </a:fld>
             <a:endParaRPr lang="en-US">
               <a:solidFill>
@@ -2156,7 +2156,7 @@
                 </a:solidFill>
               </a:rPr>
               <a:pPr/>
-              <a:t>6/26/2014</a:t>
+              <a:t>1/19/2015</a:t>
             </a:fld>
             <a:endParaRPr lang="en-US">
               <a:solidFill>
@@ -2476,7 +2476,7 @@
                 </a:solidFill>
               </a:rPr>
               <a:pPr/>
-              <a:t>6/26/2014</a:t>
+              <a:t>1/19/2015</a:t>
             </a:fld>
             <a:endParaRPr lang="en-US">
               <a:solidFill>
@@ -2930,7 +2930,7 @@
                 </a:solidFill>
               </a:rPr>
               <a:pPr/>
-              <a:t>6/26/2014</a:t>
+              <a:t>1/19/2015</a:t>
             </a:fld>
             <a:endParaRPr lang="en-US">
               <a:solidFill>
@@ -3080,7 +3080,7 @@
                 </a:solidFill>
               </a:rPr>
               <a:pPr/>
-              <a:t>6/26/2014</a:t>
+              <a:t>1/19/2015</a:t>
             </a:fld>
             <a:endParaRPr lang="en-US">
               <a:solidFill>
@@ -3207,7 +3207,7 @@
                 </a:solidFill>
               </a:rPr>
               <a:pPr/>
-              <a:t>6/26/2014</a:t>
+              <a:t>1/19/2015</a:t>
             </a:fld>
             <a:endParaRPr lang="en-US">
               <a:solidFill>
@@ -3516,7 +3516,7 @@
                 </a:solidFill>
               </a:rPr>
               <a:pPr/>
-              <a:t>6/26/2014</a:t>
+              <a:t>1/19/2015</a:t>
             </a:fld>
             <a:endParaRPr lang="en-US">
               <a:solidFill>
@@ -3718,7 +3718,7 @@
                 </a:solidFill>
               </a:rPr>
               <a:pPr/>
-              <a:t>6/26/2014</a:t>
+              <a:t>1/19/2015</a:t>
             </a:fld>
             <a:endParaRPr lang="en-US" dirty="0">
               <a:solidFill>
@@ -4003,7 +4003,7 @@
                 </a:solidFill>
               </a:rPr>
               <a:pPr/>
-              <a:t>6/26/2014</a:t>
+              <a:t>1/19/2015</a:t>
             </a:fld>
             <a:endParaRPr lang="en-US">
               <a:solidFill>
@@ -4205,7 +4205,7 @@
                 </a:solidFill>
               </a:rPr>
               <a:pPr/>
-              <a:t>6/26/2014</a:t>
+              <a:t>1/19/2015</a:t>
             </a:fld>
             <a:endParaRPr lang="en-US">
               <a:solidFill>
@@ -4417,7 +4417,7 @@
                 </a:solidFill>
               </a:rPr>
               <a:pPr/>
-              <a:t>6/26/2014</a:t>
+              <a:t>1/19/2015</a:t>
             </a:fld>
             <a:endParaRPr lang="en-US">
               <a:solidFill>
@@ -4695,7 +4695,7 @@
                 </a:solidFill>
               </a:rPr>
               <a:pPr/>
-              <a:t>6/26/2014</a:t>
+              <a:t>1/19/2015</a:t>
             </a:fld>
             <a:endParaRPr lang="en-US" dirty="0">
               <a:solidFill>
@@ -5015,7 +5015,7 @@
                 </a:solidFill>
               </a:rPr>
               <a:pPr/>
-              <a:t>6/26/2014</a:t>
+              <a:t>1/19/2015</a:t>
             </a:fld>
             <a:endParaRPr lang="en-US" dirty="0">
               <a:solidFill>
@@ -5469,7 +5469,7 @@
                 </a:solidFill>
               </a:rPr>
               <a:pPr/>
-              <a:t>6/26/2014</a:t>
+              <a:t>1/19/2015</a:t>
             </a:fld>
             <a:endParaRPr lang="en-US" dirty="0">
               <a:solidFill>
@@ -5619,7 +5619,7 @@
                 </a:solidFill>
               </a:rPr>
               <a:pPr/>
-              <a:t>6/26/2014</a:t>
+              <a:t>1/19/2015</a:t>
             </a:fld>
             <a:endParaRPr lang="en-US" dirty="0">
               <a:solidFill>
@@ -5746,7 +5746,7 @@
                 </a:solidFill>
               </a:rPr>
               <a:pPr/>
-              <a:t>6/26/2014</a:t>
+              <a:t>1/19/2015</a:t>
             </a:fld>
             <a:endParaRPr lang="en-US" dirty="0">
               <a:solidFill>
@@ -6055,7 +6055,7 @@
                 </a:solidFill>
               </a:rPr>
               <a:pPr/>
-              <a:t>6/26/2014</a:t>
+              <a:t>1/19/2015</a:t>
             </a:fld>
             <a:endParaRPr lang="en-US" dirty="0">
               <a:solidFill>
@@ -6340,7 +6340,7 @@
                 </a:solidFill>
               </a:rPr>
               <a:pPr/>
-              <a:t>6/26/2014</a:t>
+              <a:t>1/19/2015</a:t>
             </a:fld>
             <a:endParaRPr lang="en-US" dirty="0">
               <a:solidFill>
@@ -6585,7 +6585,7 @@
                 </a:solidFill>
               </a:rPr>
               <a:pPr/>
-              <a:t>6/26/2014</a:t>
+              <a:t>1/19/2015</a:t>
             </a:fld>
             <a:endParaRPr lang="en-US" dirty="0">
               <a:solidFill>
@@ -7127,7 +7127,7 @@
                 </a:solidFill>
               </a:rPr>
               <a:pPr/>
-              <a:t>6/26/2014</a:t>
+              <a:t>1/19/2015</a:t>
             </a:fld>
             <a:endParaRPr lang="en-US">
               <a:solidFill>
@@ -7535,8 +7535,8 @@
         </p:nvSpPr>
         <p:spPr>
           <a:xfrm>
-            <a:off x="2798497" y="304800"/>
-            <a:ext cx="4994124" cy="523220"/>
+            <a:off x="2227094" y="152400"/>
+            <a:ext cx="4445832" cy="523220"/>
           </a:xfrm>
           <a:prstGeom prst="rect">
             <a:avLst/>
@@ -7550,13 +7550,18 @@
           <a:lstStyle/>
           <a:p>
             <a:r>
-              <a:rPr lang="en-US" sz="2800" b="1" dirty="0">
+              <a:rPr lang="en-US" sz="2800" b="1" dirty="0" smtClean="0">
                 <a:solidFill>
                   <a:prstClr val="black"/>
                 </a:solidFill>
               </a:rPr>
-              <a:t>WiMan Intelligent Layout: NEW!</a:t>
-            </a:r>
+              <a:t>OSP Widget Manager Layout</a:t>
+            </a:r>
+            <a:endParaRPr lang="en-US" sz="2800" b="1" dirty="0">
+              <a:solidFill>
+                <a:prstClr val="black"/>
+              </a:solidFill>
+            </a:endParaRPr>
           </a:p>
         </p:txBody>
       </p:sp>
@@ -7568,7 +7573,7 @@
         </p:nvSpPr>
         <p:spPr>
           <a:xfrm>
-            <a:off x="304800" y="914400"/>
+            <a:off x="304800" y="814376"/>
             <a:ext cx="6629400" cy="461665"/>
           </a:xfrm>
           <a:prstGeom prst="rect">
@@ -7601,8 +7606,8 @@
         </p:nvSpPr>
         <p:spPr>
           <a:xfrm>
-            <a:off x="2900638" y="945177"/>
-            <a:ext cx="2864887" cy="400110"/>
+            <a:off x="2911029" y="845153"/>
+            <a:ext cx="2519216" cy="400110"/>
           </a:xfrm>
           <a:prstGeom prst="rect">
             <a:avLst/>
@@ -7616,13 +7621,22 @@
           <a:lstStyle/>
           <a:p>
             <a:r>
-              <a:rPr lang="en-US" sz="2000" dirty="0">
-                <a:solidFill>
-                  <a:prstClr val="black"/>
-                </a:solidFill>
-              </a:rPr>
-              <a:t>Display Mode: Windowed</a:t>
-            </a:r>
+              <a:rPr lang="en-US" sz="2000" dirty="0" err="1"/>
+              <a:t>WindowStyle</a:t>
+            </a:r>
+            <a:r>
+              <a:rPr lang="en-US" sz="2000" dirty="0"/>
+              <a:t>="</a:t>
+            </a:r>
+            <a:r>
+              <a:rPr lang="en-US" sz="2000" dirty="0" smtClean="0"/>
+              <a:t>None” </a:t>
+            </a:r>
+            <a:endParaRPr lang="en-US" sz="2000" dirty="0">
+              <a:solidFill>
+                <a:prstClr val="black"/>
+              </a:solidFill>
+            </a:endParaRPr>
           </a:p>
         </p:txBody>
       </p:sp>
@@ -7634,7 +7648,7 @@
         </p:nvSpPr>
         <p:spPr>
           <a:xfrm>
-            <a:off x="456440" y="4554603"/>
+            <a:off x="1188358" y="5490358"/>
             <a:ext cx="724878" cy="307777"/>
           </a:xfrm>
           <a:prstGeom prst="rect">
@@ -7667,7 +7681,7 @@
         </p:nvSpPr>
         <p:spPr>
           <a:xfrm>
-            <a:off x="1982473" y="3977712"/>
+            <a:off x="2714391" y="4913467"/>
             <a:ext cx="4935075" cy="914400"/>
           </a:xfrm>
           <a:prstGeom prst="rect">
@@ -7713,8 +7727,25 @@
                   </a:srgbClr>
                 </a:solidFill>
               </a:rPr>
-              <a:t>Widget space: 1140W, 210H</a:t>
-            </a:r>
+              <a:t>Widget space: 1140W, </a:t>
+            </a:r>
+            <a:r>
+              <a:rPr lang="en-US" dirty="0" smtClean="0">
+                <a:solidFill>
+                  <a:srgbClr val="1F497D">
+                    <a:lumMod val="75000"/>
+                  </a:srgbClr>
+                </a:solidFill>
+              </a:rPr>
+              <a:t>206H</a:t>
+            </a:r>
+            <a:endParaRPr lang="en-US" dirty="0">
+              <a:solidFill>
+                <a:srgbClr val="1F497D">
+                  <a:lumMod val="75000"/>
+                </a:srgbClr>
+              </a:solidFill>
+            </a:endParaRPr>
           </a:p>
         </p:txBody>
       </p:sp>
@@ -7726,7 +7757,7 @@
         </p:nvSpPr>
         <p:spPr>
           <a:xfrm>
-            <a:off x="1640728" y="3977712"/>
+            <a:off x="2372646" y="4913467"/>
             <a:ext cx="341745" cy="914400"/>
           </a:xfrm>
           <a:prstGeom prst="rect">
@@ -7781,7 +7812,7 @@
         </p:nvSpPr>
         <p:spPr>
           <a:xfrm rot="5400000">
-            <a:off x="1506800" y="4359721"/>
+            <a:off x="2238718" y="5295476"/>
             <a:ext cx="609597" cy="150381"/>
           </a:xfrm>
           <a:prstGeom prst="triangle">
@@ -7833,7 +7864,7 @@
         </p:nvSpPr>
         <p:spPr>
           <a:xfrm>
-            <a:off x="6917549" y="3977711"/>
+            <a:off x="7649467" y="4913466"/>
             <a:ext cx="341745" cy="914400"/>
           </a:xfrm>
           <a:prstGeom prst="rect">
@@ -7888,7 +7919,7 @@
         </p:nvSpPr>
         <p:spPr>
           <a:xfrm rot="5400000" flipV="1">
-            <a:off x="6771713" y="4347814"/>
+            <a:off x="7503631" y="5283569"/>
             <a:ext cx="609597" cy="174194"/>
           </a:xfrm>
           <a:prstGeom prst="triangle">
@@ -7940,7 +7971,7 @@
         </p:nvSpPr>
         <p:spPr>
           <a:xfrm>
-            <a:off x="1551097" y="3893717"/>
+            <a:off x="2283015" y="4829472"/>
             <a:ext cx="152400" cy="152400"/>
           </a:xfrm>
           <a:prstGeom prst="ellipse">
@@ -8011,7 +8042,7 @@
         </p:nvCxnSpPr>
         <p:spPr>
           <a:xfrm flipV="1">
-            <a:off x="1196652" y="4032262"/>
+            <a:off x="1928570" y="4968017"/>
             <a:ext cx="381000" cy="481445"/>
           </a:xfrm>
           <a:prstGeom prst="straightConnector1">
@@ -8047,7 +8078,7 @@
         </p:nvSpPr>
         <p:spPr>
           <a:xfrm>
-            <a:off x="6849200" y="3920531"/>
+            <a:off x="7581118" y="4856286"/>
             <a:ext cx="152400" cy="152400"/>
           </a:xfrm>
           <a:prstGeom prst="ellipse">
@@ -8120,7 +8151,7 @@
         </p:nvCxnSpPr>
         <p:spPr>
           <a:xfrm flipH="1">
-            <a:off x="6979282" y="3727554"/>
+            <a:off x="7711200" y="4663309"/>
             <a:ext cx="236015" cy="215295"/>
           </a:xfrm>
           <a:prstGeom prst="straightConnector1">
@@ -8156,7 +8187,7 @@
         </p:nvSpPr>
         <p:spPr>
           <a:xfrm>
-            <a:off x="7260982" y="3524546"/>
+            <a:off x="7992900" y="4460301"/>
             <a:ext cx="998991" cy="307777"/>
           </a:xfrm>
           <a:prstGeom prst="rect">
@@ -8189,7 +8220,7 @@
         </p:nvSpPr>
         <p:spPr>
           <a:xfrm rot="16200000">
-            <a:off x="1565149" y="4970391"/>
+            <a:off x="2297067" y="5906146"/>
             <a:ext cx="493474" cy="341180"/>
           </a:xfrm>
           <a:prstGeom prst="leftBrace">
@@ -8231,7 +8262,7 @@
         </p:nvSpPr>
         <p:spPr>
           <a:xfrm>
-            <a:off x="1551097" y="5395442"/>
+            <a:off x="2283015" y="6331197"/>
             <a:ext cx="527709" cy="307777"/>
           </a:xfrm>
           <a:prstGeom prst="rect">
@@ -8258,14 +8289,14 @@
       </p:sp>
       <p:sp>
         <p:nvSpPr>
-          <p:cNvPr id="6" name="TextBox 5"/>
+          <p:cNvPr id="34" name="TextBox 33"/>
           <p:cNvSpPr txBox="1"/>
           <p:nvPr/>
         </p:nvSpPr>
         <p:spPr>
           <a:xfrm>
-            <a:off x="5327159" y="1450333"/>
-            <a:ext cx="2336986" cy="646331"/>
+            <a:off x="204300" y="1361675"/>
+            <a:ext cx="7820218" cy="2308324"/>
           </a:xfrm>
           <a:prstGeom prst="rect">
             <a:avLst/>
@@ -8279,66 +8310,105 @@
           <a:lstStyle/>
           <a:p>
             <a:r>
-              <a:rPr lang="en-US" dirty="0">
-                <a:solidFill>
-                  <a:prstClr val="black"/>
-                </a:solidFill>
-              </a:rPr>
-              <a:t>No more “Side Bar”</a:t>
-            </a:r>
-          </a:p>
-          <a:p>
-            <a:r>
-              <a:rPr lang="en-US" dirty="0">
-                <a:solidFill>
-                  <a:prstClr val="black"/>
-                </a:solidFill>
-              </a:rPr>
-              <a:t>No more “Control Box”</a:t>
-            </a:r>
-          </a:p>
-        </p:txBody>
-      </p:sp>
-      <p:sp>
-        <p:nvSpPr>
-          <p:cNvPr id="34" name="TextBox 33"/>
-          <p:cNvSpPr txBox="1"/>
-          <p:nvPr/>
-        </p:nvSpPr>
-        <p:spPr>
-          <a:xfrm>
-            <a:off x="204300" y="1450333"/>
-            <a:ext cx="3874587" cy="646331"/>
-          </a:xfrm>
-          <a:prstGeom prst="rect">
-            <a:avLst/>
-          </a:prstGeom>
-          <a:noFill/>
-        </p:spPr>
-        <p:txBody>
-          <a:bodyPr wrap="none" rtlCol="0">
-            <a:spAutoFit/>
-          </a:bodyPr>
-          <a:lstStyle/>
-          <a:p>
-            <a:r>
-              <a:rPr lang="en-US" dirty="0">
-                <a:solidFill>
-                  <a:prstClr val="black"/>
-                </a:solidFill>
-              </a:rPr>
-              <a:t>Previous control box space: 180px wide</a:t>
-            </a:r>
-          </a:p>
-          <a:p>
-            <a:r>
-              <a:rPr lang="en-US" dirty="0">
-                <a:solidFill>
-                  <a:prstClr val="black"/>
-                </a:solidFill>
-              </a:rPr>
-              <a:t>Arrows: 70px (140) total width</a:t>
-            </a:r>
+              <a:rPr lang="en-US" dirty="0"/>
+              <a:t>Three standard window sizes are allowed, referred to as UU size (unit utilization). </a:t>
+            </a:r>
+            <a:endParaRPr lang="en-US" dirty="0" smtClean="0"/>
+          </a:p>
+          <a:p>
+            <a:r>
+              <a:rPr lang="en-US" dirty="0" smtClean="0"/>
+              <a:t>The </a:t>
+            </a:r>
+            <a:r>
+              <a:rPr lang="en-US" dirty="0"/>
+              <a:t>widget display area measures 1140 x </a:t>
+            </a:r>
+            <a:r>
+              <a:rPr lang="en-US" dirty="0" smtClean="0"/>
+              <a:t>206 </a:t>
+            </a:r>
+            <a:r>
+              <a:rPr lang="en-US" dirty="0"/>
+              <a:t>pixels. </a:t>
+            </a:r>
+            <a:endParaRPr lang="en-US" dirty="0" smtClean="0"/>
+          </a:p>
+          <a:p>
+            <a:r>
+              <a:rPr lang="en-US" dirty="0" smtClean="0"/>
+              <a:t>We </a:t>
+            </a:r>
+            <a:r>
+              <a:rPr lang="en-US" dirty="0"/>
+              <a:t>then divided this by 3 to give the base unit of 380 x </a:t>
+            </a:r>
+            <a:r>
+              <a:rPr lang="en-US" dirty="0" smtClean="0"/>
+              <a:t>206. </a:t>
+            </a:r>
+          </a:p>
+          <a:p>
+            <a:r>
+              <a:rPr lang="en-US" dirty="0" smtClean="0"/>
+              <a:t>Thus</a:t>
+            </a:r>
+            <a:r>
+              <a:rPr lang="en-US" dirty="0"/>
+              <a:t>, up to three 1UU widgets may be displayed in their entirety, simultaneously</a:t>
+            </a:r>
+            <a:r>
+              <a:rPr lang="en-US" dirty="0" smtClean="0"/>
+              <a:t>.</a:t>
+            </a:r>
+          </a:p>
+          <a:p>
+            <a:r>
+              <a:rPr lang="en-US" dirty="0" smtClean="0"/>
+              <a:t> </a:t>
+            </a:r>
+            <a:endParaRPr lang="es-ES" sz="800" dirty="0" smtClean="0"/>
+          </a:p>
+          <a:p>
+            <a:pPr marL="285750" indent="-285750">
+              <a:buFont typeface="Wingdings"/>
+              <a:buChar char="Ø"/>
+            </a:pPr>
+            <a:r>
+              <a:rPr lang="en-US" dirty="0"/>
+              <a:t>Small (1UU): 380W x 208H</a:t>
+            </a:r>
+            <a:endParaRPr lang="en-US" dirty="0" smtClean="0"/>
+          </a:p>
+          <a:p>
+            <a:pPr marL="285750" indent="-285750">
+              <a:buFont typeface="Wingdings"/>
+              <a:buChar char="Ø"/>
+            </a:pPr>
+            <a:r>
+              <a:rPr lang="pt-BR" dirty="0"/>
+              <a:t>Medium (2UU): 760W x 208H</a:t>
+            </a:r>
+            <a:endParaRPr lang="en-US" dirty="0" smtClean="0"/>
+          </a:p>
+          <a:p>
+            <a:pPr marL="285750" indent="-285750">
+              <a:buFont typeface="Wingdings"/>
+              <a:buChar char="Ø"/>
+            </a:pPr>
+            <a:r>
+              <a:rPr lang="es-ES" dirty="0" err="1"/>
+              <a:t>Large</a:t>
+            </a:r>
+            <a:r>
+              <a:rPr lang="es-ES" dirty="0"/>
+              <a:t> (3UU): 1140W x </a:t>
+            </a:r>
+            <a:r>
+              <a:rPr lang="es-ES" dirty="0" smtClean="0"/>
+              <a:t>208H</a:t>
+            </a:r>
+            <a:endParaRPr lang="en-US" dirty="0" smtClean="0"/>
           </a:p>
         </p:txBody>
       </p:sp>
@@ -8350,7 +8420,7 @@
         </p:nvSpPr>
         <p:spPr>
           <a:xfrm>
-            <a:off x="4175219" y="5262419"/>
+            <a:off x="4907137" y="6093023"/>
             <a:ext cx="550151" cy="307777"/>
           </a:xfrm>
           <a:prstGeom prst="rect">
@@ -8383,7 +8453,7 @@
         </p:nvSpPr>
         <p:spPr>
           <a:xfrm rot="16200000">
-            <a:off x="4295369" y="2251599"/>
+            <a:off x="5027287" y="3187354"/>
             <a:ext cx="309853" cy="5618000"/>
           </a:xfrm>
           <a:prstGeom prst="leftBrace">
@@ -8430,7 +8500,7 @@
         </p:nvSpPr>
         <p:spPr>
           <a:xfrm>
-            <a:off x="1982473" y="2791799"/>
+            <a:off x="2714391" y="3727554"/>
             <a:ext cx="1645920" cy="935755"/>
           </a:xfrm>
           <a:prstGeom prst="rect">
@@ -8485,8 +8555,21 @@
                   <a:prstClr val="black"/>
                 </a:solidFill>
               </a:rPr>
-              <a:t>380W, 210H</a:t>
-            </a:r>
+              <a:t>380W, </a:t>
+            </a:r>
+            <a:r>
+              <a:rPr lang="en-US" sz="1400" dirty="0" smtClean="0">
+                <a:solidFill>
+                  <a:prstClr val="black"/>
+                </a:solidFill>
+              </a:rPr>
+              <a:t>206H</a:t>
+            </a:r>
+            <a:endParaRPr lang="en-US" sz="1400" dirty="0">
+              <a:solidFill>
+                <a:prstClr val="black"/>
+              </a:solidFill>
+            </a:endParaRPr>
           </a:p>
         </p:txBody>
       </p:sp>
@@ -8498,7 +8581,7 @@
         </p:nvSpPr>
         <p:spPr>
           <a:xfrm>
-            <a:off x="3628393" y="2791798"/>
+            <a:off x="4360311" y="3727553"/>
             <a:ext cx="1645920" cy="935755"/>
           </a:xfrm>
           <a:prstGeom prst="rect">
@@ -8553,8 +8636,21 @@
                   <a:prstClr val="black"/>
                 </a:solidFill>
               </a:rPr>
-              <a:t>380W, 210H</a:t>
-            </a:r>
+              <a:t>380W, </a:t>
+            </a:r>
+            <a:r>
+              <a:rPr lang="en-US" sz="1400" dirty="0" smtClean="0">
+                <a:solidFill>
+                  <a:prstClr val="black"/>
+                </a:solidFill>
+              </a:rPr>
+              <a:t>206H</a:t>
+            </a:r>
+            <a:endParaRPr lang="en-US" sz="1400" dirty="0">
+              <a:solidFill>
+                <a:prstClr val="black"/>
+              </a:solidFill>
+            </a:endParaRPr>
           </a:p>
         </p:txBody>
       </p:sp>
@@ -8566,7 +8662,7 @@
         </p:nvSpPr>
         <p:spPr>
           <a:xfrm>
-            <a:off x="5274313" y="2791799"/>
+            <a:off x="6006231" y="3727554"/>
             <a:ext cx="1645920" cy="935755"/>
           </a:xfrm>
           <a:prstGeom prst="rect">
@@ -8621,8 +8717,67 @@
                   <a:prstClr val="black"/>
                 </a:solidFill>
               </a:rPr>
-              <a:t>380W, 210H</a:t>
-            </a:r>
+              <a:t>380W, </a:t>
+            </a:r>
+            <a:r>
+              <a:rPr lang="en-US" sz="1400" dirty="0" smtClean="0">
+                <a:solidFill>
+                  <a:prstClr val="black"/>
+                </a:solidFill>
+              </a:rPr>
+              <a:t>206H</a:t>
+            </a:r>
+            <a:endParaRPr lang="en-US" sz="1400" dirty="0">
+              <a:solidFill>
+                <a:prstClr val="black"/>
+              </a:solidFill>
+            </a:endParaRPr>
+          </a:p>
+        </p:txBody>
+      </p:sp>
+      <p:sp>
+        <p:nvSpPr>
+          <p:cNvPr id="32" name="TextBox 31"/>
+          <p:cNvSpPr txBox="1"/>
+          <p:nvPr/>
+        </p:nvSpPr>
+        <p:spPr>
+          <a:xfrm>
+            <a:off x="4792427" y="6484973"/>
+            <a:ext cx="4283545" cy="261610"/>
+          </a:xfrm>
+          <a:prstGeom prst="rect">
+            <a:avLst/>
+          </a:prstGeom>
+          <a:noFill/>
+        </p:spPr>
+        <p:txBody>
+          <a:bodyPr wrap="none" rtlCol="0">
+            <a:spAutoFit/>
+          </a:bodyPr>
+          <a:lstStyle/>
+          <a:p>
+            <a:r>
+              <a:rPr lang="en-US" sz="1100" dirty="0" smtClean="0"/>
+              <a:t>For more Information, refer </a:t>
+            </a:r>
+            <a:r>
+              <a:rPr lang="en-US" sz="1100" dirty="0"/>
+              <a:t>to the OSP Widget Manager User's </a:t>
+            </a:r>
+            <a:r>
+              <a:rPr lang="en-US" sz="1100" dirty="0" smtClean="0"/>
+              <a:t>Manual</a:t>
+            </a:r>
+            <a:r>
+              <a:rPr lang="en-US" sz="1100" dirty="0" smtClean="0"/>
+              <a:t> </a:t>
+            </a:r>
+            <a:endParaRPr lang="en-US" sz="1100" dirty="0">
+              <a:solidFill>
+                <a:prstClr val="black"/>
+              </a:solidFill>
+            </a:endParaRPr>
           </a:p>
         </p:txBody>
       </p:sp>

</xml_diff>

<commit_message>
Improved platform identification and THINC API version identification / readiness check
</commit_message>
<xml_diff>
--- a/Documentation/19inch_control_layout.pptx
+++ b/Documentation/19inch_control_layout.pptx
@@ -6,13 +6,12 @@
     <p:sldMasterId id="2147483672" r:id="rId2"/>
   </p:sldMasterIdLst>
   <p:notesMasterIdLst>
-    <p:notesMasterId r:id="rId7"/>
+    <p:notesMasterId r:id="rId6"/>
   </p:notesMasterIdLst>
   <p:sldIdLst>
     <p:sldId id="257" r:id="rId3"/>
     <p:sldId id="260" r:id="rId4"/>
     <p:sldId id="258" r:id="rId5"/>
-    <p:sldId id="259" r:id="rId6"/>
   </p:sldIdLst>
   <p:sldSz cx="9144000" cy="6858000" type="screen4x3"/>
   <p:notesSz cx="6858000" cy="9144000"/>
@@ -196,7 +195,7 @@
           <a:p>
             <a:fld id="{072B8F1F-ED4A-496F-A690-F89B57685F05}" type="datetimeFigureOut">
               <a:rPr lang="en-US" smtClean="0"/>
-              <a:t>1/19/2015</a:t>
+              <a:t>1/28/2015</a:t>
             </a:fld>
             <a:endParaRPr lang="en-US"/>
           </a:p>
@@ -592,7 +591,15 @@
           <a:bodyPr/>
           <a:lstStyle/>
           <a:p>
-            <a:endParaRPr lang="en-US"/>
+            <a:r>
+              <a:rPr lang="en-US" dirty="0" smtClean="0"/>
+              <a:t>This layout is only available</a:t>
+            </a:r>
+            <a:r>
+              <a:rPr lang="en-US" baseline="0" dirty="0" smtClean="0"/>
+              <a:t> on 19” display models.</a:t>
+            </a:r>
+            <a:endParaRPr lang="en-US" dirty="0"/>
           </a:p>
         </p:txBody>
       </p:sp>
@@ -676,7 +683,15 @@
           <a:bodyPr/>
           <a:lstStyle/>
           <a:p>
-            <a:endParaRPr lang="en-US"/>
+            <a:r>
+              <a:rPr lang="en-US" dirty="0" smtClean="0"/>
+              <a:t>This is on</a:t>
+            </a:r>
+            <a:r>
+              <a:rPr lang="en-US" baseline="0" dirty="0" smtClean="0"/>
+              <a:t> a standard 15” display.</a:t>
+            </a:r>
+            <a:endParaRPr lang="en-US" dirty="0"/>
           </a:p>
         </p:txBody>
       </p:sp>
@@ -707,90 +722,6 @@
     <p:extLst>
       <p:ext uri="{BB962C8B-B14F-4D97-AF65-F5344CB8AC3E}">
         <p14:creationId xmlns:p14="http://schemas.microsoft.com/office/powerpoint/2010/main" val="2863971884"/>
-      </p:ext>
-    </p:extLst>
-  </p:cSld>
-  <p:clrMapOvr>
-    <a:masterClrMapping/>
-  </p:clrMapOvr>
-</p:notes>
-</file>
-
-<file path=ppt/notesSlides/notesSlide4.xml><?xml version="1.0" encoding="utf-8"?>
-<p:notes xmlns:a="http://schemas.openxmlformats.org/drawingml/2006/main" xmlns:r="http://schemas.openxmlformats.org/officeDocument/2006/relationships" xmlns:p="http://schemas.openxmlformats.org/presentationml/2006/main">
-  <p:cSld>
-    <p:spTree>
-      <p:nvGrpSpPr>
-        <p:cNvPr id="1" name=""/>
-        <p:cNvGrpSpPr/>
-        <p:nvPr/>
-      </p:nvGrpSpPr>
-      <p:grpSpPr>
-        <a:xfrm>
-          <a:off x="0" y="0"/>
-          <a:ext cx="0" cy="0"/>
-          <a:chOff x="0" y="0"/>
-          <a:chExt cx="0" cy="0"/>
-        </a:xfrm>
-      </p:grpSpPr>
-      <p:sp>
-        <p:nvSpPr>
-          <p:cNvPr id="2" name="Slide Image Placeholder 1"/>
-          <p:cNvSpPr>
-            <a:spLocks noGrp="1" noRot="1" noChangeAspect="1"/>
-          </p:cNvSpPr>
-          <p:nvPr>
-            <p:ph type="sldImg"/>
-          </p:nvPr>
-        </p:nvSpPr>
-        <p:spPr/>
-      </p:sp>
-      <p:sp>
-        <p:nvSpPr>
-          <p:cNvPr id="3" name="Notes Placeholder 2"/>
-          <p:cNvSpPr>
-            <a:spLocks noGrp="1"/>
-          </p:cNvSpPr>
-          <p:nvPr>
-            <p:ph type="body" idx="1"/>
-          </p:nvPr>
-        </p:nvSpPr>
-        <p:spPr/>
-        <p:txBody>
-          <a:bodyPr/>
-          <a:lstStyle/>
-          <a:p>
-            <a:endParaRPr lang="en-US"/>
-          </a:p>
-        </p:txBody>
-      </p:sp>
-      <p:sp>
-        <p:nvSpPr>
-          <p:cNvPr id="4" name="Slide Number Placeholder 3"/>
-          <p:cNvSpPr>
-            <a:spLocks noGrp="1"/>
-          </p:cNvSpPr>
-          <p:nvPr>
-            <p:ph type="sldNum" sz="quarter" idx="10"/>
-          </p:nvPr>
-        </p:nvSpPr>
-        <p:spPr/>
-        <p:txBody>
-          <a:bodyPr/>
-          <a:lstStyle/>
-          <a:p>
-            <a:fld id="{FFF11CB3-48AD-42FF-A908-FFC2238760D0}" type="slidenum">
-              <a:rPr lang="en-US" smtClean="0"/>
-              <a:t>4</a:t>
-            </a:fld>
-            <a:endParaRPr lang="en-US"/>
-          </a:p>
-        </p:txBody>
-      </p:sp>
-    </p:spTree>
-    <p:extLst>
-      <p:ext uri="{BB962C8B-B14F-4D97-AF65-F5344CB8AC3E}">
-        <p14:creationId xmlns:p14="http://schemas.microsoft.com/office/powerpoint/2010/main" val="1896300603"/>
       </p:ext>
     </p:extLst>
   </p:cSld>
@@ -988,7 +919,7 @@
                 </a:solidFill>
               </a:rPr>
               <a:pPr/>
-              <a:t>1/19/2015</a:t>
+              <a:t>1/28/2015</a:t>
             </a:fld>
             <a:endParaRPr lang="en-US" dirty="0">
               <a:solidFill>
@@ -1190,7 +1121,7 @@
                 </a:solidFill>
               </a:rPr>
               <a:pPr/>
-              <a:t>1/19/2015</a:t>
+              <a:t>1/28/2015</a:t>
             </a:fld>
             <a:endParaRPr lang="en-US" dirty="0">
               <a:solidFill>
@@ -1402,7 +1333,7 @@
                 </a:solidFill>
               </a:rPr>
               <a:pPr/>
-              <a:t>1/19/2015</a:t>
+              <a:t>1/28/2015</a:t>
             </a:fld>
             <a:endParaRPr lang="en-US" dirty="0">
               <a:solidFill>
@@ -1676,7 +1607,7 @@
                 </a:solidFill>
               </a:rPr>
               <a:pPr/>
-              <a:t>1/19/2015</a:t>
+              <a:t>1/28/2015</a:t>
             </a:fld>
             <a:endParaRPr lang="en-US">
               <a:solidFill>
@@ -1878,7 +1809,7 @@
                 </a:solidFill>
               </a:rPr>
               <a:pPr/>
-              <a:t>1/19/2015</a:t>
+              <a:t>1/28/2015</a:t>
             </a:fld>
             <a:endParaRPr lang="en-US">
               <a:solidFill>
@@ -2156,7 +2087,7 @@
                 </a:solidFill>
               </a:rPr>
               <a:pPr/>
-              <a:t>1/19/2015</a:t>
+              <a:t>1/28/2015</a:t>
             </a:fld>
             <a:endParaRPr lang="en-US">
               <a:solidFill>
@@ -2476,7 +2407,7 @@
                 </a:solidFill>
               </a:rPr>
               <a:pPr/>
-              <a:t>1/19/2015</a:t>
+              <a:t>1/28/2015</a:t>
             </a:fld>
             <a:endParaRPr lang="en-US">
               <a:solidFill>
@@ -2930,7 +2861,7 @@
                 </a:solidFill>
               </a:rPr>
               <a:pPr/>
-              <a:t>1/19/2015</a:t>
+              <a:t>1/28/2015</a:t>
             </a:fld>
             <a:endParaRPr lang="en-US">
               <a:solidFill>
@@ -3080,7 +3011,7 @@
                 </a:solidFill>
               </a:rPr>
               <a:pPr/>
-              <a:t>1/19/2015</a:t>
+              <a:t>1/28/2015</a:t>
             </a:fld>
             <a:endParaRPr lang="en-US">
               <a:solidFill>
@@ -3207,7 +3138,7 @@
                 </a:solidFill>
               </a:rPr>
               <a:pPr/>
-              <a:t>1/19/2015</a:t>
+              <a:t>1/28/2015</a:t>
             </a:fld>
             <a:endParaRPr lang="en-US">
               <a:solidFill>
@@ -3516,7 +3447,7 @@
                 </a:solidFill>
               </a:rPr>
               <a:pPr/>
-              <a:t>1/19/2015</a:t>
+              <a:t>1/28/2015</a:t>
             </a:fld>
             <a:endParaRPr lang="en-US">
               <a:solidFill>
@@ -3718,7 +3649,7 @@
                 </a:solidFill>
               </a:rPr>
               <a:pPr/>
-              <a:t>1/19/2015</a:t>
+              <a:t>1/28/2015</a:t>
             </a:fld>
             <a:endParaRPr lang="en-US" dirty="0">
               <a:solidFill>
@@ -4003,7 +3934,7 @@
                 </a:solidFill>
               </a:rPr>
               <a:pPr/>
-              <a:t>1/19/2015</a:t>
+              <a:t>1/28/2015</a:t>
             </a:fld>
             <a:endParaRPr lang="en-US">
               <a:solidFill>
@@ -4205,7 +4136,7 @@
                 </a:solidFill>
               </a:rPr>
               <a:pPr/>
-              <a:t>1/19/2015</a:t>
+              <a:t>1/28/2015</a:t>
             </a:fld>
             <a:endParaRPr lang="en-US">
               <a:solidFill>
@@ -4417,7 +4348,7 @@
                 </a:solidFill>
               </a:rPr>
               <a:pPr/>
-              <a:t>1/19/2015</a:t>
+              <a:t>1/28/2015</a:t>
             </a:fld>
             <a:endParaRPr lang="en-US">
               <a:solidFill>
@@ -4695,7 +4626,7 @@
                 </a:solidFill>
               </a:rPr>
               <a:pPr/>
-              <a:t>1/19/2015</a:t>
+              <a:t>1/28/2015</a:t>
             </a:fld>
             <a:endParaRPr lang="en-US" dirty="0">
               <a:solidFill>
@@ -5015,7 +4946,7 @@
                 </a:solidFill>
               </a:rPr>
               <a:pPr/>
-              <a:t>1/19/2015</a:t>
+              <a:t>1/28/2015</a:t>
             </a:fld>
             <a:endParaRPr lang="en-US" dirty="0">
               <a:solidFill>
@@ -5469,7 +5400,7 @@
                 </a:solidFill>
               </a:rPr>
               <a:pPr/>
-              <a:t>1/19/2015</a:t>
+              <a:t>1/28/2015</a:t>
             </a:fld>
             <a:endParaRPr lang="en-US" dirty="0">
               <a:solidFill>
@@ -5619,7 +5550,7 @@
                 </a:solidFill>
               </a:rPr>
               <a:pPr/>
-              <a:t>1/19/2015</a:t>
+              <a:t>1/28/2015</a:t>
             </a:fld>
             <a:endParaRPr lang="en-US" dirty="0">
               <a:solidFill>
@@ -5746,7 +5677,7 @@
                 </a:solidFill>
               </a:rPr>
               <a:pPr/>
-              <a:t>1/19/2015</a:t>
+              <a:t>1/28/2015</a:t>
             </a:fld>
             <a:endParaRPr lang="en-US" dirty="0">
               <a:solidFill>
@@ -6055,7 +5986,7 @@
                 </a:solidFill>
               </a:rPr>
               <a:pPr/>
-              <a:t>1/19/2015</a:t>
+              <a:t>1/28/2015</a:t>
             </a:fld>
             <a:endParaRPr lang="en-US" dirty="0">
               <a:solidFill>
@@ -6340,7 +6271,7 @@
                 </a:solidFill>
               </a:rPr>
               <a:pPr/>
-              <a:t>1/19/2015</a:t>
+              <a:t>1/28/2015</a:t>
             </a:fld>
             <a:endParaRPr lang="en-US" dirty="0">
               <a:solidFill>
@@ -6585,7 +6516,7 @@
                 </a:solidFill>
               </a:rPr>
               <a:pPr/>
-              <a:t>1/19/2015</a:t>
+              <a:t>1/28/2015</a:t>
             </a:fld>
             <a:endParaRPr lang="en-US" dirty="0">
               <a:solidFill>
@@ -7127,7 +7058,7 @@
                 </a:solidFill>
               </a:rPr>
               <a:pPr/>
-              <a:t>1/19/2015</a:t>
+              <a:t>1/28/2015</a:t>
             </a:fld>
             <a:endParaRPr lang="en-US">
               <a:solidFill>
@@ -8743,7 +8674,7 @@
         </p:nvSpPr>
         <p:spPr>
           <a:xfrm>
-            <a:off x="4792427" y="6484973"/>
+            <a:off x="3200400" y="2515837"/>
             <a:ext cx="4283545" cy="261610"/>
           </a:xfrm>
           <a:prstGeom prst="rect">
@@ -8767,11 +8698,7 @@
             </a:r>
             <a:r>
               <a:rPr lang="en-US" sz="1100" dirty="0" smtClean="0"/>
-              <a:t>Manual</a:t>
-            </a:r>
-            <a:r>
-              <a:rPr lang="en-US" sz="1100" dirty="0" smtClean="0"/>
-              <a:t> </a:t>
+              <a:t>Manual </a:t>
             </a:r>
             <a:endParaRPr lang="en-US" sz="1100" dirty="0">
               <a:solidFill>
@@ -9931,73 +9858,6 @@
     <p:extLst>
       <p:ext uri="{BB962C8B-B14F-4D97-AF65-F5344CB8AC3E}">
         <p14:creationId xmlns:p14="http://schemas.microsoft.com/office/powerpoint/2010/main" val="446183266"/>
-      </p:ext>
-    </p:extLst>
-  </p:cSld>
-  <p:clrMapOvr>
-    <a:masterClrMapping/>
-  </p:clrMapOvr>
-  <p:timing>
-    <p:tnLst>
-      <p:par>
-        <p:cTn id="1" dur="indefinite" restart="never" nodeType="tmRoot"/>
-      </p:par>
-    </p:tnLst>
-  </p:timing>
-</p:sld>
-</file>
-
-<file path=ppt/slides/slide4.xml><?xml version="1.0" encoding="utf-8"?>
-<p:sld xmlns:a="http://schemas.openxmlformats.org/drawingml/2006/main" xmlns:r="http://schemas.openxmlformats.org/officeDocument/2006/relationships" xmlns:p="http://schemas.openxmlformats.org/presentationml/2006/main">
-  <p:cSld>
-    <p:spTree>
-      <p:nvGrpSpPr>
-        <p:cNvPr id="1" name=""/>
-        <p:cNvGrpSpPr/>
-        <p:nvPr/>
-      </p:nvGrpSpPr>
-      <p:grpSpPr>
-        <a:xfrm>
-          <a:off x="0" y="0"/>
-          <a:ext cx="0" cy="0"/>
-          <a:chOff x="0" y="0"/>
-          <a:chExt cx="0" cy="0"/>
-        </a:xfrm>
-      </p:grpSpPr>
-      <p:pic>
-        <p:nvPicPr>
-          <p:cNvPr id="4" name="Picture 3"/>
-          <p:cNvPicPr>
-            <a:picLocks noChangeAspect="1"/>
-          </p:cNvPicPr>
-          <p:nvPr/>
-        </p:nvPicPr>
-        <p:blipFill>
-          <a:blip r:embed="rId3">
-            <a:extLst>
-              <a:ext uri="{28A0092B-C50C-407E-A947-70E740481C1C}">
-                <a14:useLocalDpi xmlns:a14="http://schemas.microsoft.com/office/drawing/2010/main" val="0"/>
-              </a:ext>
-            </a:extLst>
-          </a:blip>
-          <a:stretch>
-            <a:fillRect/>
-          </a:stretch>
-        </p:blipFill>
-        <p:spPr>
-          <a:xfrm>
-            <a:off x="1285875" y="933450"/>
-            <a:ext cx="6572250" cy="4991100"/>
-          </a:xfrm>
-          <a:prstGeom prst="rect">
-            <a:avLst/>
-          </a:prstGeom>
-        </p:spPr>
-      </p:pic>
-    </p:spTree>
-    <p:extLst>
-      <p:ext uri="{BB962C8B-B14F-4D97-AF65-F5344CB8AC3E}">
-        <p14:creationId xmlns:p14="http://schemas.microsoft.com/office/powerpoint/2010/main" val="3483768068"/>
       </p:ext>
     </p:extLst>
   </p:cSld>

</xml_diff>

<commit_message>
SDK v0.7 SCOUT Library 1.0.2.0 API version 1.18.0.0 added
</commit_message>
<xml_diff>
--- a/Documentation/19inch_control_layout.pptx
+++ b/Documentation/19inch_control_layout.pptx
@@ -195,7 +195,7 @@
           <a:p>
             <a:fld id="{072B8F1F-ED4A-496F-A690-F89B57685F05}" type="datetimeFigureOut">
               <a:rPr lang="en-US" smtClean="0"/>
-              <a:t>1/28/2015</a:t>
+              <a:t>12/15/2015</a:t>
             </a:fld>
             <a:endParaRPr lang="en-US"/>
           </a:p>
@@ -919,7 +919,7 @@
                 </a:solidFill>
               </a:rPr>
               <a:pPr/>
-              <a:t>1/28/2015</a:t>
+              <a:t>12/15/2015</a:t>
             </a:fld>
             <a:endParaRPr lang="en-US" dirty="0">
               <a:solidFill>
@@ -1121,7 +1121,7 @@
                 </a:solidFill>
               </a:rPr>
               <a:pPr/>
-              <a:t>1/28/2015</a:t>
+              <a:t>12/15/2015</a:t>
             </a:fld>
             <a:endParaRPr lang="en-US" dirty="0">
               <a:solidFill>
@@ -1333,7 +1333,7 @@
                 </a:solidFill>
               </a:rPr>
               <a:pPr/>
-              <a:t>1/28/2015</a:t>
+              <a:t>12/15/2015</a:t>
             </a:fld>
             <a:endParaRPr lang="en-US" dirty="0">
               <a:solidFill>
@@ -1607,7 +1607,7 @@
                 </a:solidFill>
               </a:rPr>
               <a:pPr/>
-              <a:t>1/28/2015</a:t>
+              <a:t>12/15/2015</a:t>
             </a:fld>
             <a:endParaRPr lang="en-US">
               <a:solidFill>
@@ -1809,7 +1809,7 @@
                 </a:solidFill>
               </a:rPr>
               <a:pPr/>
-              <a:t>1/28/2015</a:t>
+              <a:t>12/15/2015</a:t>
             </a:fld>
             <a:endParaRPr lang="en-US">
               <a:solidFill>
@@ -2087,7 +2087,7 @@
                 </a:solidFill>
               </a:rPr>
               <a:pPr/>
-              <a:t>1/28/2015</a:t>
+              <a:t>12/15/2015</a:t>
             </a:fld>
             <a:endParaRPr lang="en-US">
               <a:solidFill>
@@ -2407,7 +2407,7 @@
                 </a:solidFill>
               </a:rPr>
               <a:pPr/>
-              <a:t>1/28/2015</a:t>
+              <a:t>12/15/2015</a:t>
             </a:fld>
             <a:endParaRPr lang="en-US">
               <a:solidFill>
@@ -2861,7 +2861,7 @@
                 </a:solidFill>
               </a:rPr>
               <a:pPr/>
-              <a:t>1/28/2015</a:t>
+              <a:t>12/15/2015</a:t>
             </a:fld>
             <a:endParaRPr lang="en-US">
               <a:solidFill>
@@ -3011,7 +3011,7 @@
                 </a:solidFill>
               </a:rPr>
               <a:pPr/>
-              <a:t>1/28/2015</a:t>
+              <a:t>12/15/2015</a:t>
             </a:fld>
             <a:endParaRPr lang="en-US">
               <a:solidFill>
@@ -3138,7 +3138,7 @@
                 </a:solidFill>
               </a:rPr>
               <a:pPr/>
-              <a:t>1/28/2015</a:t>
+              <a:t>12/15/2015</a:t>
             </a:fld>
             <a:endParaRPr lang="en-US">
               <a:solidFill>
@@ -3447,7 +3447,7 @@
                 </a:solidFill>
               </a:rPr>
               <a:pPr/>
-              <a:t>1/28/2015</a:t>
+              <a:t>12/15/2015</a:t>
             </a:fld>
             <a:endParaRPr lang="en-US">
               <a:solidFill>
@@ -3649,7 +3649,7 @@
                 </a:solidFill>
               </a:rPr>
               <a:pPr/>
-              <a:t>1/28/2015</a:t>
+              <a:t>12/15/2015</a:t>
             </a:fld>
             <a:endParaRPr lang="en-US" dirty="0">
               <a:solidFill>
@@ -3934,7 +3934,7 @@
                 </a:solidFill>
               </a:rPr>
               <a:pPr/>
-              <a:t>1/28/2015</a:t>
+              <a:t>12/15/2015</a:t>
             </a:fld>
             <a:endParaRPr lang="en-US">
               <a:solidFill>
@@ -4136,7 +4136,7 @@
                 </a:solidFill>
               </a:rPr>
               <a:pPr/>
-              <a:t>1/28/2015</a:t>
+              <a:t>12/15/2015</a:t>
             </a:fld>
             <a:endParaRPr lang="en-US">
               <a:solidFill>
@@ -4348,7 +4348,7 @@
                 </a:solidFill>
               </a:rPr>
               <a:pPr/>
-              <a:t>1/28/2015</a:t>
+              <a:t>12/15/2015</a:t>
             </a:fld>
             <a:endParaRPr lang="en-US">
               <a:solidFill>
@@ -4626,7 +4626,7 @@
                 </a:solidFill>
               </a:rPr>
               <a:pPr/>
-              <a:t>1/28/2015</a:t>
+              <a:t>12/15/2015</a:t>
             </a:fld>
             <a:endParaRPr lang="en-US" dirty="0">
               <a:solidFill>
@@ -4946,7 +4946,7 @@
                 </a:solidFill>
               </a:rPr>
               <a:pPr/>
-              <a:t>1/28/2015</a:t>
+              <a:t>12/15/2015</a:t>
             </a:fld>
             <a:endParaRPr lang="en-US" dirty="0">
               <a:solidFill>
@@ -5400,7 +5400,7 @@
                 </a:solidFill>
               </a:rPr>
               <a:pPr/>
-              <a:t>1/28/2015</a:t>
+              <a:t>12/15/2015</a:t>
             </a:fld>
             <a:endParaRPr lang="en-US" dirty="0">
               <a:solidFill>
@@ -5550,7 +5550,7 @@
                 </a:solidFill>
               </a:rPr>
               <a:pPr/>
-              <a:t>1/28/2015</a:t>
+              <a:t>12/15/2015</a:t>
             </a:fld>
             <a:endParaRPr lang="en-US" dirty="0">
               <a:solidFill>
@@ -5677,7 +5677,7 @@
                 </a:solidFill>
               </a:rPr>
               <a:pPr/>
-              <a:t>1/28/2015</a:t>
+              <a:t>12/15/2015</a:t>
             </a:fld>
             <a:endParaRPr lang="en-US" dirty="0">
               <a:solidFill>
@@ -5986,7 +5986,7 @@
                 </a:solidFill>
               </a:rPr>
               <a:pPr/>
-              <a:t>1/28/2015</a:t>
+              <a:t>12/15/2015</a:t>
             </a:fld>
             <a:endParaRPr lang="en-US" dirty="0">
               <a:solidFill>
@@ -6271,7 +6271,7 @@
                 </a:solidFill>
               </a:rPr>
               <a:pPr/>
-              <a:t>1/28/2015</a:t>
+              <a:t>12/15/2015</a:t>
             </a:fld>
             <a:endParaRPr lang="en-US" dirty="0">
               <a:solidFill>
@@ -6516,7 +6516,7 @@
                 </a:solidFill>
               </a:rPr>
               <a:pPr/>
-              <a:t>1/28/2015</a:t>
+              <a:t>12/15/2015</a:t>
             </a:fld>
             <a:endParaRPr lang="en-US" dirty="0">
               <a:solidFill>
@@ -7058,7 +7058,7 @@
                 </a:solidFill>
               </a:rPr>
               <a:pPr/>
-              <a:t>1/28/2015</a:t>
+              <a:t>12/15/2015</a:t>
             </a:fld>
             <a:endParaRPr lang="en-US">
               <a:solidFill>
@@ -7504,7 +7504,7 @@
         </p:nvSpPr>
         <p:spPr>
           <a:xfrm>
-            <a:off x="304800" y="814376"/>
+            <a:off x="304800" y="675620"/>
             <a:ext cx="6629400" cy="461665"/>
           </a:xfrm>
           <a:prstGeom prst="rect">
@@ -7537,7 +7537,7 @@
         </p:nvSpPr>
         <p:spPr>
           <a:xfrm>
-            <a:off x="2911029" y="845153"/>
+            <a:off x="2911029" y="706397"/>
             <a:ext cx="2519216" cy="400110"/>
           </a:xfrm>
           <a:prstGeom prst="rect">
@@ -7579,7 +7579,7 @@
         </p:nvSpPr>
         <p:spPr>
           <a:xfrm>
-            <a:off x="1188358" y="5490358"/>
+            <a:off x="1284691" y="5683335"/>
             <a:ext cx="724878" cy="307777"/>
           </a:xfrm>
           <a:prstGeom prst="rect">
@@ -7612,7 +7612,7 @@
         </p:nvSpPr>
         <p:spPr>
           <a:xfrm>
-            <a:off x="2714391" y="4913467"/>
+            <a:off x="2810724" y="5106444"/>
             <a:ext cx="4935075" cy="914400"/>
           </a:xfrm>
           <a:prstGeom prst="rect">
@@ -7688,7 +7688,7 @@
         </p:nvSpPr>
         <p:spPr>
           <a:xfrm>
-            <a:off x="2372646" y="4913467"/>
+            <a:off x="2468979" y="5106444"/>
             <a:ext cx="341745" cy="914400"/>
           </a:xfrm>
           <a:prstGeom prst="rect">
@@ -7743,7 +7743,7 @@
         </p:nvSpPr>
         <p:spPr>
           <a:xfrm rot="5400000">
-            <a:off x="2238718" y="5295476"/>
+            <a:off x="2335051" y="5488453"/>
             <a:ext cx="609597" cy="150381"/>
           </a:xfrm>
           <a:prstGeom prst="triangle">
@@ -7795,7 +7795,7 @@
         </p:nvSpPr>
         <p:spPr>
           <a:xfrm>
-            <a:off x="7649467" y="4913466"/>
+            <a:off x="7745800" y="5106443"/>
             <a:ext cx="341745" cy="914400"/>
           </a:xfrm>
           <a:prstGeom prst="rect">
@@ -7850,7 +7850,7 @@
         </p:nvSpPr>
         <p:spPr>
           <a:xfrm rot="5400000" flipV="1">
-            <a:off x="7503631" y="5283569"/>
+            <a:off x="7599964" y="5476546"/>
             <a:ext cx="609597" cy="174194"/>
           </a:xfrm>
           <a:prstGeom prst="triangle">
@@ -7902,7 +7902,7 @@
         </p:nvSpPr>
         <p:spPr>
           <a:xfrm>
-            <a:off x="2283015" y="4829472"/>
+            <a:off x="2379348" y="5022449"/>
             <a:ext cx="152400" cy="152400"/>
           </a:xfrm>
           <a:prstGeom prst="ellipse">
@@ -7973,7 +7973,7 @@
         </p:nvCxnSpPr>
         <p:spPr>
           <a:xfrm flipV="1">
-            <a:off x="1928570" y="4968017"/>
+            <a:off x="2024903" y="5160994"/>
             <a:ext cx="381000" cy="481445"/>
           </a:xfrm>
           <a:prstGeom prst="straightConnector1">
@@ -8009,7 +8009,7 @@
         </p:nvSpPr>
         <p:spPr>
           <a:xfrm>
-            <a:off x="7581118" y="4856286"/>
+            <a:off x="7677451" y="5049263"/>
             <a:ext cx="152400" cy="152400"/>
           </a:xfrm>
           <a:prstGeom prst="ellipse">
@@ -8082,7 +8082,7 @@
         </p:nvCxnSpPr>
         <p:spPr>
           <a:xfrm flipH="1">
-            <a:off x="7711200" y="4663309"/>
+            <a:off x="7807533" y="4856286"/>
             <a:ext cx="236015" cy="215295"/>
           </a:xfrm>
           <a:prstGeom prst="straightConnector1">
@@ -8118,7 +8118,7 @@
         </p:nvSpPr>
         <p:spPr>
           <a:xfrm>
-            <a:off x="7992900" y="4460301"/>
+            <a:off x="8089233" y="4653278"/>
             <a:ext cx="998991" cy="307777"/>
           </a:xfrm>
           <a:prstGeom prst="rect">
@@ -8151,7 +8151,7 @@
         </p:nvSpPr>
         <p:spPr>
           <a:xfrm rot="16200000">
-            <a:off x="2297067" y="5906146"/>
+            <a:off x="2393400" y="6099123"/>
             <a:ext cx="493474" cy="341180"/>
           </a:xfrm>
           <a:prstGeom prst="leftBrace">
@@ -8193,7 +8193,7 @@
         </p:nvSpPr>
         <p:spPr>
           <a:xfrm>
-            <a:off x="2283015" y="6331197"/>
+            <a:off x="2379348" y="6524174"/>
             <a:ext cx="527709" cy="307777"/>
           </a:xfrm>
           <a:prstGeom prst="rect">
@@ -8226,8 +8226,8 @@
         </p:nvSpPr>
         <p:spPr>
           <a:xfrm>
-            <a:off x="204300" y="1361675"/>
-            <a:ext cx="7820218" cy="2308324"/>
+            <a:off x="209744" y="1219927"/>
+            <a:ext cx="7783156" cy="2585323"/>
           </a:xfrm>
           <a:prstGeom prst="rect">
             <a:avLst/>
@@ -8242,9 +8242,20 @@
           <a:p>
             <a:r>
               <a:rPr lang="en-US" dirty="0"/>
-              <a:t>Three standard window sizes are allowed, referred to as UU size (unit utilization). </a:t>
+              <a:t>Three standard window sizes are allowed, </a:t>
             </a:r>
             <a:endParaRPr lang="en-US" dirty="0" smtClean="0"/>
+          </a:p>
+          <a:p>
+            <a:r>
+              <a:rPr lang="en-US" dirty="0" smtClean="0"/>
+              <a:t>referred </a:t>
+            </a:r>
+            <a:r>
+              <a:rPr lang="en-US" dirty="0"/>
+              <a:t>to as UU size (unit utilization). </a:t>
+            </a:r>
+            <a:endParaRPr lang="en-US" dirty="0"/>
           </a:p>
           <a:p>
             <a:r>
@@ -8333,7 +8344,11 @@
             </a:r>
             <a:r>
               <a:rPr lang="es-ES" dirty="0"/>
-              <a:t> (3UU): 1140W x </a:t>
+              <a:t> </a:t>
+            </a:r>
+            <a:r>
+              <a:rPr lang="es-ES" dirty="0"/>
+              <a:t>(3UU): 1140W x </a:t>
             </a:r>
             <a:r>
               <a:rPr lang="es-ES" dirty="0" smtClean="0"/>
@@ -8351,7 +8366,7 @@
         </p:nvSpPr>
         <p:spPr>
           <a:xfrm>
-            <a:off x="4907137" y="6093023"/>
+            <a:off x="5003470" y="6286000"/>
             <a:ext cx="550151" cy="307777"/>
           </a:xfrm>
           <a:prstGeom prst="rect">
@@ -8384,7 +8399,7 @@
         </p:nvSpPr>
         <p:spPr>
           <a:xfrm rot="16200000">
-            <a:off x="5027287" y="3187354"/>
+            <a:off x="5123620" y="3380331"/>
             <a:ext cx="309853" cy="5618000"/>
           </a:xfrm>
           <a:prstGeom prst="leftBrace">
@@ -8431,7 +8446,7 @@
         </p:nvSpPr>
         <p:spPr>
           <a:xfrm>
-            <a:off x="2714391" y="3727554"/>
+            <a:off x="2810724" y="3920531"/>
             <a:ext cx="1645920" cy="935755"/>
           </a:xfrm>
           <a:prstGeom prst="rect">
@@ -8512,7 +8527,7 @@
         </p:nvSpPr>
         <p:spPr>
           <a:xfrm>
-            <a:off x="4360311" y="3727553"/>
+            <a:off x="4456644" y="3920530"/>
             <a:ext cx="1645920" cy="935755"/>
           </a:xfrm>
           <a:prstGeom prst="rect">
@@ -8593,7 +8608,7 @@
         </p:nvSpPr>
         <p:spPr>
           <a:xfrm>
-            <a:off x="6006231" y="3727554"/>
+            <a:off x="6102564" y="3920531"/>
             <a:ext cx="1645920" cy="935755"/>
           </a:xfrm>
           <a:prstGeom prst="rect">
@@ -8674,7 +8689,7 @@
         </p:nvSpPr>
         <p:spPr>
           <a:xfrm>
-            <a:off x="3200400" y="2515837"/>
+            <a:off x="3480147" y="2833574"/>
             <a:ext cx="4283545" cy="261610"/>
           </a:xfrm>
           <a:prstGeom prst="rect">
@@ -8708,6 +8723,36 @@
           </a:p>
         </p:txBody>
       </p:sp>
+      <p:pic>
+        <p:nvPicPr>
+          <p:cNvPr id="2" name="Picture 1"/>
+          <p:cNvPicPr>
+            <a:picLocks noChangeAspect="1"/>
+          </p:cNvPicPr>
+          <p:nvPr/>
+        </p:nvPicPr>
+        <p:blipFill>
+          <a:blip r:embed="rId3">
+            <a:extLst>
+              <a:ext uri="{28A0092B-C50C-407E-A947-70E740481C1C}">
+                <a14:useLocalDpi xmlns:a14="http://schemas.microsoft.com/office/drawing/2010/main" val="0"/>
+              </a:ext>
+            </a:extLst>
+          </a:blip>
+          <a:stretch>
+            <a:fillRect/>
+          </a:stretch>
+        </p:blipFill>
+        <p:spPr>
+          <a:xfrm>
+            <a:off x="7233923" y="296882"/>
+            <a:ext cx="1619250" cy="1619250"/>
+          </a:xfrm>
+          <a:prstGeom prst="rect">
+            <a:avLst/>
+          </a:prstGeom>
+        </p:spPr>
+      </p:pic>
     </p:spTree>
     <p:extLst>
       <p:ext uri="{BB962C8B-B14F-4D97-AF65-F5344CB8AC3E}">

</xml_diff>